<commit_message>
Added line about memory leaks
</commit_message>
<xml_diff>
--- a/PsychoPy-Part2/PsychoPy-part2.pptx
+++ b/PsychoPy-Part2/PsychoPy-part2.pptx
@@ -223,7 +223,7 @@
           <a:p>
             <a:fld id="{A71BFCC6-2EC9-4EC2-A3C4-9B645E93EB78}" type="datetimeFigureOut">
               <a:rPr lang="en-US" smtClean="0"/>
-              <a:t>10/15/2015</a:t>
+              <a:t>5/17/2016</a:t>
             </a:fld>
             <a:endParaRPr lang="en-US"/>
           </a:p>
@@ -1983,7 +1983,7 @@
             <a:fld id="{B61BEF0D-F0BB-DE4B-95CE-6DB70DBA9567}" type="datetimeFigureOut">
               <a:rPr lang="en-US" smtClean="0"/>
               <a:pPr/>
-              <a:t>10/15/2015</a:t>
+              <a:t>5/17/2016</a:t>
             </a:fld>
             <a:endParaRPr lang="en-US" dirty="0"/>
           </a:p>
@@ -2236,7 +2236,7 @@
             <a:fld id="{B61BEF0D-F0BB-DE4B-95CE-6DB70DBA9567}" type="datetimeFigureOut">
               <a:rPr lang="en-US" smtClean="0"/>
               <a:pPr/>
-              <a:t>10/15/2015</a:t>
+              <a:t>5/17/2016</a:t>
             </a:fld>
             <a:endParaRPr lang="en-US" dirty="0"/>
           </a:p>
@@ -2552,7 +2552,7 @@
             <a:fld id="{B61BEF0D-F0BB-DE4B-95CE-6DB70DBA9567}" type="datetimeFigureOut">
               <a:rPr lang="en-US" smtClean="0"/>
               <a:pPr/>
-              <a:t>10/15/2015</a:t>
+              <a:t>5/17/2016</a:t>
             </a:fld>
             <a:endParaRPr lang="en-US" dirty="0"/>
           </a:p>
@@ -2887,7 +2887,7 @@
             <a:fld id="{B61BEF0D-F0BB-DE4B-95CE-6DB70DBA9567}" type="datetimeFigureOut">
               <a:rPr lang="en-US" smtClean="0"/>
               <a:pPr/>
-              <a:t>10/15/2015</a:t>
+              <a:t>5/17/2016</a:t>
             </a:fld>
             <a:endParaRPr lang="en-US" dirty="0"/>
           </a:p>
@@ -3203,7 +3203,7 @@
             <a:fld id="{B61BEF0D-F0BB-DE4B-95CE-6DB70DBA9567}" type="datetimeFigureOut">
               <a:rPr lang="en-US" smtClean="0"/>
               <a:pPr/>
-              <a:t>10/15/2015</a:t>
+              <a:t>5/17/2016</a:t>
             </a:fld>
             <a:endParaRPr lang="en-US" dirty="0"/>
           </a:p>
@@ -3598,7 +3598,7 @@
             <a:fld id="{B61BEF0D-F0BB-DE4B-95CE-6DB70DBA9567}" type="datetimeFigureOut">
               <a:rPr lang="en-US" smtClean="0"/>
               <a:pPr/>
-              <a:t>10/15/2015</a:t>
+              <a:t>5/17/2016</a:t>
             </a:fld>
             <a:endParaRPr lang="en-US" dirty="0"/>
           </a:p>
@@ -3769,7 +3769,7 @@
           <a:p>
             <a:fld id="{55C6B4A9-1611-4792-9094-5F34BCA07E0B}" type="datetimeFigureOut">
               <a:rPr lang="en-US" smtClean="0"/>
-              <a:t>10/15/2015</a:t>
+              <a:t>5/17/2016</a:t>
             </a:fld>
             <a:endParaRPr lang="en-US" dirty="0"/>
           </a:p>
@@ -3950,7 +3950,7 @@
             <a:fld id="{B61BEF0D-F0BB-DE4B-95CE-6DB70DBA9567}" type="datetimeFigureOut">
               <a:rPr lang="en-US" smtClean="0"/>
               <a:pPr/>
-              <a:t>10/15/2015</a:t>
+              <a:t>5/17/2016</a:t>
             </a:fld>
             <a:endParaRPr lang="en-US" dirty="0"/>
           </a:p>
@@ -4322,7 +4322,7 @@
             <a:fld id="{B61BEF0D-F0BB-DE4B-95CE-6DB70DBA9567}" type="datetimeFigureOut">
               <a:rPr lang="en-US" smtClean="0"/>
               <a:pPr/>
-              <a:t>10/15/2015</a:t>
+              <a:t>5/17/2016</a:t>
             </a:fld>
             <a:endParaRPr lang="en-US" dirty="0"/>
           </a:p>
@@ -4571,7 +4571,7 @@
             <a:fld id="{B61BEF0D-F0BB-DE4B-95CE-6DB70DBA9567}" type="datetimeFigureOut">
               <a:rPr lang="en-US" smtClean="0"/>
               <a:pPr/>
-              <a:t>10/15/2015</a:t>
+              <a:t>5/17/2016</a:t>
             </a:fld>
             <a:endParaRPr lang="en-US" dirty="0"/>
           </a:p>
@@ -4869,7 +4869,7 @@
           <a:p>
             <a:fld id="{EB712588-04B1-427B-82EE-E8DB90309F08}" type="datetimeFigureOut">
               <a:rPr lang="en-US" smtClean="0"/>
-              <a:t>10/15/2015</a:t>
+              <a:t>5/17/2016</a:t>
             </a:fld>
             <a:endParaRPr lang="en-US" dirty="0"/>
           </a:p>
@@ -5249,7 +5249,7 @@
             <a:fld id="{B61BEF0D-F0BB-DE4B-95CE-6DB70DBA9567}" type="datetimeFigureOut">
               <a:rPr lang="en-US" smtClean="0"/>
               <a:pPr/>
-              <a:t>10/15/2015</a:t>
+              <a:t>5/17/2016</a:t>
             </a:fld>
             <a:endParaRPr lang="en-US" dirty="0"/>
           </a:p>
@@ -5374,7 +5374,7 @@
             <a:fld id="{B61BEF0D-F0BB-DE4B-95CE-6DB70DBA9567}" type="datetimeFigureOut">
               <a:rPr lang="en-US" smtClean="0"/>
               <a:pPr/>
-              <a:t>10/15/2015</a:t>
+              <a:t>5/17/2016</a:t>
             </a:fld>
             <a:endParaRPr lang="en-US" dirty="0"/>
           </a:p>
@@ -5471,7 +5471,7 @@
             <a:fld id="{B61BEF0D-F0BB-DE4B-95CE-6DB70DBA9567}" type="datetimeFigureOut">
               <a:rPr lang="en-US" smtClean="0"/>
               <a:pPr/>
-              <a:t>10/15/2015</a:t>
+              <a:t>5/17/2016</a:t>
             </a:fld>
             <a:endParaRPr lang="en-US" dirty="0"/>
           </a:p>
@@ -5727,7 +5727,7 @@
           <a:p>
             <a:fld id="{42A54C80-263E-416B-A8E0-580EDEADCBDC}" type="datetimeFigureOut">
               <a:rPr lang="en-US" smtClean="0"/>
-              <a:t>10/15/2015</a:t>
+              <a:t>5/17/2016</a:t>
             </a:fld>
             <a:endParaRPr lang="en-US" dirty="0"/>
           </a:p>
@@ -5991,7 +5991,7 @@
             <a:fld id="{B61BEF0D-F0BB-DE4B-95CE-6DB70DBA9567}" type="datetimeFigureOut">
               <a:rPr lang="en-US" smtClean="0"/>
               <a:pPr/>
-              <a:t>10/15/2015</a:t>
+              <a:t>5/17/2016</a:t>
             </a:fld>
             <a:endParaRPr lang="en-US" dirty="0"/>
           </a:p>
@@ -6808,7 +6808,7 @@
             <a:fld id="{B61BEF0D-F0BB-DE4B-95CE-6DB70DBA9567}" type="datetimeFigureOut">
               <a:rPr lang="en-US" smtClean="0"/>
               <a:pPr/>
-              <a:t>10/15/2015</a:t>
+              <a:t>5/17/2016</a:t>
             </a:fld>
             <a:endParaRPr lang="en-US" dirty="0"/>
           </a:p>
@@ -10327,7 +10327,6 @@
               <a:rPr lang="en-GB" dirty="0" smtClean="0"/>
               <a:t>A “container” of reusable code that does “something”</a:t>
             </a:r>
-            <a:endParaRPr lang="en-GB" dirty="0" smtClean="0"/>
           </a:p>
           <a:p>
             <a:r>
@@ -10368,7 +10367,6 @@
               <a:rPr lang="en-GB" dirty="0" smtClean="0"/>
               <a:t>Only runs when called</a:t>
             </a:r>
-            <a:endParaRPr lang="en-GB" dirty="0" smtClean="0"/>
           </a:p>
           <a:p>
             <a:r>
@@ -10685,18 +10683,7 @@
                   </a:schemeClr>
                 </a:solidFill>
               </a:rPr>
-              <a:t>Adding </a:t>
-            </a:r>
-            <a:r>
-              <a:rPr lang="en" sz="3000" dirty="0" smtClean="0">
-                <a:solidFill>
-                  <a:schemeClr val="accent1">
-                    <a:lumMod val="60000"/>
-                    <a:lumOff val="40000"/>
-                  </a:schemeClr>
-                </a:solidFill>
-              </a:rPr>
-              <a:t>functions to your experiment</a:t>
+              <a:t>Adding functions to your experiment</a:t>
             </a:r>
             <a:endParaRPr lang="en" sz="3000" dirty="0">
               <a:solidFill>
@@ -11108,29 +11095,16 @@
             </a:r>
             <a:r>
               <a:rPr lang="en-GB" sz="1600" dirty="0" smtClean="0"/>
-              <a:t>with the header </a:t>
-            </a:r>
+              <a:t>with the header from the </a:t>
+            </a:r>
+          </a:p>
+          <a:p>
+            <a:pPr marL="400050" lvl="2" indent="0">
+              <a:buNone/>
+            </a:pPr>
             <a:r>
               <a:rPr lang="en-GB" sz="1600" dirty="0" smtClean="0"/>
-              <a:t>from </a:t>
-            </a:r>
-            <a:r>
-              <a:rPr lang="en-GB" sz="1600" dirty="0" smtClean="0"/>
-              <a:t>the </a:t>
-            </a:r>
-            <a:endParaRPr lang="en-GB" sz="1600" dirty="0" smtClean="0"/>
-          </a:p>
-          <a:p>
-            <a:pPr marL="400050" lvl="2" indent="0">
-              <a:buNone/>
-            </a:pPr>
-            <a:r>
-              <a:rPr lang="en-GB" sz="1600" dirty="0" smtClean="0"/>
-              <a:t>Excel </a:t>
-            </a:r>
-            <a:r>
-              <a:rPr lang="en-GB" sz="1600" dirty="0" smtClean="0"/>
-              <a:t>file</a:t>
+              <a:t>Excel file</a:t>
             </a:r>
             <a:endParaRPr lang="en" sz="1600" dirty="0" smtClean="0"/>
           </a:p>
@@ -12224,7 +12198,21 @@
           <a:p>
             <a:r>
               <a:rPr lang="en-GB" dirty="0" smtClean="0"/>
-              <a:t>Check your data output and ensure its solid</a:t>
+              <a:t>Watch out for memory leaks – from video stimuli </a:t>
+            </a:r>
+            <a:r>
+              <a:rPr lang="en-GB" smtClean="0"/>
+              <a:t>in particular!</a:t>
+            </a:r>
+          </a:p>
+          <a:p>
+            <a:r>
+              <a:rPr lang="en-GB" dirty="0" smtClean="0"/>
+              <a:t>Check </a:t>
+            </a:r>
+            <a:r>
+              <a:rPr lang="en-GB" dirty="0" smtClean="0"/>
+              <a:t>your data output and ensure its solid</a:t>
             </a:r>
           </a:p>
           <a:p>
@@ -12267,8 +12255,18 @@
             </a:pPr>
             <a:r>
               <a:rPr lang="en-GB" dirty="0" smtClean="0"/>
-              <a:t>Basically do some quick analysis early to make sure!</a:t>
-            </a:r>
+              <a:t>Basically do some quick analysis early to make sure</a:t>
+            </a:r>
+            <a:r>
+              <a:rPr lang="en-GB" dirty="0" smtClean="0"/>
+              <a:t>!</a:t>
+            </a:r>
+          </a:p>
+          <a:p>
+            <a:pPr>
+              <a:buFont typeface="Courier New" panose="02070309020205020404" pitchFamily="49" charset="0"/>
+              <a:buChar char="o"/>
+            </a:pPr>
             <a:endParaRPr lang="en" dirty="0" smtClean="0"/>
           </a:p>
           <a:p>

</xml_diff>

<commit_message>
Tidy ups for 2018/19
</commit_message>
<xml_diff>
--- a/PsychoPy-Part2/PsychoPy-part2.pptx
+++ b/PsychoPy-Part2/PsychoPy-part2.pptx
@@ -223,7 +223,7 @@
           <a:p>
             <a:fld id="{A71BFCC6-2EC9-4EC2-A3C4-9B645E93EB78}" type="datetimeFigureOut">
               <a:rPr lang="en-US" smtClean="0"/>
-              <a:t>10/12/2017</a:t>
+              <a:t>10/9/2018</a:t>
             </a:fld>
             <a:endParaRPr lang="en-US"/>
           </a:p>
@@ -1983,7 +1983,7 @@
             <a:fld id="{B61BEF0D-F0BB-DE4B-95CE-6DB70DBA9567}" type="datetimeFigureOut">
               <a:rPr lang="en-US" smtClean="0"/>
               <a:pPr/>
-              <a:t>10/12/2017</a:t>
+              <a:t>10/9/2018</a:t>
             </a:fld>
             <a:endParaRPr lang="en-US" dirty="0"/>
           </a:p>
@@ -2236,7 +2236,7 @@
             <a:fld id="{B61BEF0D-F0BB-DE4B-95CE-6DB70DBA9567}" type="datetimeFigureOut">
               <a:rPr lang="en-US" smtClean="0"/>
               <a:pPr/>
-              <a:t>10/12/2017</a:t>
+              <a:t>10/9/2018</a:t>
             </a:fld>
             <a:endParaRPr lang="en-US" dirty="0"/>
           </a:p>
@@ -2552,7 +2552,7 @@
             <a:fld id="{B61BEF0D-F0BB-DE4B-95CE-6DB70DBA9567}" type="datetimeFigureOut">
               <a:rPr lang="en-US" smtClean="0"/>
               <a:pPr/>
-              <a:t>10/12/2017</a:t>
+              <a:t>10/9/2018</a:t>
             </a:fld>
             <a:endParaRPr lang="en-US" dirty="0"/>
           </a:p>
@@ -2887,7 +2887,7 @@
             <a:fld id="{B61BEF0D-F0BB-DE4B-95CE-6DB70DBA9567}" type="datetimeFigureOut">
               <a:rPr lang="en-US" smtClean="0"/>
               <a:pPr/>
-              <a:t>10/12/2017</a:t>
+              <a:t>10/9/2018</a:t>
             </a:fld>
             <a:endParaRPr lang="en-US" dirty="0"/>
           </a:p>
@@ -3203,7 +3203,7 @@
             <a:fld id="{B61BEF0D-F0BB-DE4B-95CE-6DB70DBA9567}" type="datetimeFigureOut">
               <a:rPr lang="en-US" smtClean="0"/>
               <a:pPr/>
-              <a:t>10/12/2017</a:t>
+              <a:t>10/9/2018</a:t>
             </a:fld>
             <a:endParaRPr lang="en-US" dirty="0"/>
           </a:p>
@@ -3598,7 +3598,7 @@
             <a:fld id="{B61BEF0D-F0BB-DE4B-95CE-6DB70DBA9567}" type="datetimeFigureOut">
               <a:rPr lang="en-US" smtClean="0"/>
               <a:pPr/>
-              <a:t>10/12/2017</a:t>
+              <a:t>10/9/2018</a:t>
             </a:fld>
             <a:endParaRPr lang="en-US" dirty="0"/>
           </a:p>
@@ -3769,7 +3769,7 @@
           <a:p>
             <a:fld id="{55C6B4A9-1611-4792-9094-5F34BCA07E0B}" type="datetimeFigureOut">
               <a:rPr lang="en-US" smtClean="0"/>
-              <a:t>10/12/2017</a:t>
+              <a:t>10/9/2018</a:t>
             </a:fld>
             <a:endParaRPr lang="en-US" dirty="0"/>
           </a:p>
@@ -3950,7 +3950,7 @@
             <a:fld id="{B61BEF0D-F0BB-DE4B-95CE-6DB70DBA9567}" type="datetimeFigureOut">
               <a:rPr lang="en-US" smtClean="0"/>
               <a:pPr/>
-              <a:t>10/12/2017</a:t>
+              <a:t>10/9/2018</a:t>
             </a:fld>
             <a:endParaRPr lang="en-US" dirty="0"/>
           </a:p>
@@ -4322,7 +4322,7 @@
             <a:fld id="{B61BEF0D-F0BB-DE4B-95CE-6DB70DBA9567}" type="datetimeFigureOut">
               <a:rPr lang="en-US" smtClean="0"/>
               <a:pPr/>
-              <a:t>10/12/2017</a:t>
+              <a:t>10/9/2018</a:t>
             </a:fld>
             <a:endParaRPr lang="en-US" dirty="0"/>
           </a:p>
@@ -4571,7 +4571,7 @@
             <a:fld id="{B61BEF0D-F0BB-DE4B-95CE-6DB70DBA9567}" type="datetimeFigureOut">
               <a:rPr lang="en-US" smtClean="0"/>
               <a:pPr/>
-              <a:t>10/12/2017</a:t>
+              <a:t>10/9/2018</a:t>
             </a:fld>
             <a:endParaRPr lang="en-US" dirty="0"/>
           </a:p>
@@ -4869,7 +4869,7 @@
           <a:p>
             <a:fld id="{EB712588-04B1-427B-82EE-E8DB90309F08}" type="datetimeFigureOut">
               <a:rPr lang="en-US" smtClean="0"/>
-              <a:t>10/12/2017</a:t>
+              <a:t>10/9/2018</a:t>
             </a:fld>
             <a:endParaRPr lang="en-US" dirty="0"/>
           </a:p>
@@ -5249,7 +5249,7 @@
             <a:fld id="{B61BEF0D-F0BB-DE4B-95CE-6DB70DBA9567}" type="datetimeFigureOut">
               <a:rPr lang="en-US" smtClean="0"/>
               <a:pPr/>
-              <a:t>10/12/2017</a:t>
+              <a:t>10/9/2018</a:t>
             </a:fld>
             <a:endParaRPr lang="en-US" dirty="0"/>
           </a:p>
@@ -5374,7 +5374,7 @@
             <a:fld id="{B61BEF0D-F0BB-DE4B-95CE-6DB70DBA9567}" type="datetimeFigureOut">
               <a:rPr lang="en-US" smtClean="0"/>
               <a:pPr/>
-              <a:t>10/12/2017</a:t>
+              <a:t>10/9/2018</a:t>
             </a:fld>
             <a:endParaRPr lang="en-US" dirty="0"/>
           </a:p>
@@ -5471,7 +5471,7 @@
             <a:fld id="{B61BEF0D-F0BB-DE4B-95CE-6DB70DBA9567}" type="datetimeFigureOut">
               <a:rPr lang="en-US" smtClean="0"/>
               <a:pPr/>
-              <a:t>10/12/2017</a:t>
+              <a:t>10/9/2018</a:t>
             </a:fld>
             <a:endParaRPr lang="en-US" dirty="0"/>
           </a:p>
@@ -5727,7 +5727,7 @@
           <a:p>
             <a:fld id="{42A54C80-263E-416B-A8E0-580EDEADCBDC}" type="datetimeFigureOut">
               <a:rPr lang="en-US" smtClean="0"/>
-              <a:t>10/12/2017</a:t>
+              <a:t>10/9/2018</a:t>
             </a:fld>
             <a:endParaRPr lang="en-US" dirty="0"/>
           </a:p>
@@ -5991,7 +5991,7 @@
             <a:fld id="{B61BEF0D-F0BB-DE4B-95CE-6DB70DBA9567}" type="datetimeFigureOut">
               <a:rPr lang="en-US" smtClean="0"/>
               <a:pPr/>
-              <a:t>10/12/2017</a:t>
+              <a:t>10/9/2018</a:t>
             </a:fld>
             <a:endParaRPr lang="en-US" dirty="0"/>
           </a:p>
@@ -6808,7 +6808,7 @@
             <a:fld id="{B61BEF0D-F0BB-DE4B-95CE-6DB70DBA9567}" type="datetimeFigureOut">
               <a:rPr lang="en-US" smtClean="0"/>
               <a:pPr/>
-              <a:t>10/12/2017</a:t>
+              <a:t>10/9/2018</a:t>
             </a:fld>
             <a:endParaRPr lang="en-US" dirty="0"/>
           </a:p>
@@ -9044,7 +9044,39 @@
             </a:pPr>
             <a:r>
               <a:rPr lang="en-GB" dirty="0"/>
-              <a:t>Open up file </a:t>
+              <a:t>Close any other </a:t>
+            </a:r>
+            <a:r>
+              <a:rPr lang="en-GB" dirty="0" err="1"/>
+              <a:t>PsychoPy</a:t>
+            </a:r>
+            <a:r>
+              <a:rPr lang="en-GB" dirty="0"/>
+              <a:t> windows you have open</a:t>
+            </a:r>
+            <a:r>
+              <a:rPr lang="en-GB" dirty="0" smtClean="0"/>
+              <a:t>.</a:t>
+            </a:r>
+            <a:endParaRPr lang="en-GB" dirty="0" smtClean="0"/>
+          </a:p>
+          <a:p>
+            <a:pPr marL="0" indent="0">
+              <a:buNone/>
+            </a:pPr>
+            <a:endParaRPr lang="en-GB" dirty="0"/>
+          </a:p>
+          <a:p>
+            <a:pPr marL="0" indent="0">
+              <a:buNone/>
+            </a:pPr>
+            <a:r>
+              <a:rPr lang="en-GB" dirty="0" smtClean="0"/>
+              <a:t>Open </a:t>
+            </a:r>
+            <a:r>
+              <a:rPr lang="en-GB" dirty="0"/>
+              <a:t>up file </a:t>
             </a:r>
             <a:r>
               <a:rPr lang="en-GB" dirty="0" smtClean="0">
@@ -9441,14 +9473,22 @@
           <a:p>
             <a:r>
               <a:rPr lang="en-GB" sz="2000" dirty="0" smtClean="0"/>
-              <a:t>Variables can be passed to a function</a:t>
+              <a:t>Variables (which we just looked at) </a:t>
+            </a:r>
+            <a:r>
+              <a:rPr lang="en-GB" sz="2000" dirty="0" smtClean="0"/>
+              <a:t>can be passed to a function</a:t>
             </a:r>
           </a:p>
           <a:p>
             <a:pPr lvl="1"/>
             <a:r>
               <a:rPr lang="en-GB" sz="1800" dirty="0" smtClean="0"/>
-              <a:t>Called “parameters”</a:t>
+              <a:t>Also called </a:t>
+            </a:r>
+            <a:r>
+              <a:rPr lang="en-GB" sz="1800" dirty="0" smtClean="0"/>
+              <a:t>“parameters”</a:t>
             </a:r>
           </a:p>
           <a:p>
@@ -9642,12 +9682,36 @@
               <a:buNone/>
             </a:pPr>
             <a:r>
-              <a:rPr lang="en" dirty="0"/>
-              <a:t>O</a:t>
-            </a:r>
+              <a:rPr lang="en-GB" dirty="0"/>
+              <a:t>Close any other </a:t>
+            </a:r>
+            <a:r>
+              <a:rPr lang="en-GB" dirty="0" err="1"/>
+              <a:t>PsychoPy</a:t>
+            </a:r>
+            <a:r>
+              <a:rPr lang="en-GB" dirty="0"/>
+              <a:t> windows you have open</a:t>
+            </a:r>
+            <a:r>
+              <a:rPr lang="en-GB" dirty="0" smtClean="0"/>
+              <a:t>.</a:t>
+            </a:r>
+            <a:endParaRPr lang="en" dirty="0" smtClean="0"/>
+          </a:p>
+          <a:p>
+            <a:pPr marL="0" indent="0">
+              <a:buNone/>
+            </a:pPr>
+            <a:endParaRPr lang="en" dirty="0"/>
+          </a:p>
+          <a:p>
+            <a:pPr marL="0" indent="0">
+              <a:buNone/>
+            </a:pPr>
             <a:r>
               <a:rPr lang="en" dirty="0" smtClean="0"/>
-              <a:t>pen </a:t>
+              <a:t>Open </a:t>
             </a:r>
             <a:r>
               <a:rPr lang="en-US" dirty="0" smtClean="0">
@@ -9805,7 +9869,7 @@
               <a:buChar char="o"/>
             </a:pPr>
             <a:r>
-              <a:rPr lang="en" sz="1800" dirty="0" smtClean="0"/>
+              <a:rPr lang="en" sz="1600" dirty="0" smtClean="0"/>
               <a:t>Read the comments in green/red.</a:t>
             </a:r>
           </a:p>
@@ -9815,17 +9879,40 @@
               <a:buChar char="o"/>
             </a:pPr>
             <a:r>
-              <a:rPr lang="en" sz="1800" dirty="0" smtClean="0"/>
-              <a:t>Look for </a:t>
-            </a:r>
-            <a:r>
-              <a:rPr lang="en" sz="1800" b="1" dirty="0" smtClean="0"/>
+              <a:rPr lang="en" sz="1600" dirty="0" smtClean="0"/>
+              <a:t>Notice the </a:t>
+            </a:r>
+            <a:r>
+              <a:rPr lang="en" sz="1600" b="1" dirty="0" smtClean="0"/>
               <a:t>month_funcs.py </a:t>
             </a:r>
             <a:r>
-              <a:rPr lang="en" sz="1800" dirty="0" smtClean="0"/>
-              <a:t>file in same directory.</a:t>
-            </a:r>
+              <a:rPr lang="en" sz="1600" dirty="0" smtClean="0"/>
+              <a:t>file in same directory</a:t>
+            </a:r>
+            <a:r>
+              <a:rPr lang="en" sz="1600" dirty="0" smtClean="0"/>
+              <a:t>.</a:t>
+            </a:r>
+          </a:p>
+          <a:p>
+            <a:pPr marL="742950" lvl="2" indent="-342900">
+              <a:buFont typeface="Courier New" panose="02070309020205020404" pitchFamily="49" charset="0"/>
+              <a:buChar char="o"/>
+            </a:pPr>
+            <a:r>
+              <a:rPr lang="en" sz="1600" dirty="0" smtClean="0"/>
+              <a:t>Try opening the file in </a:t>
+            </a:r>
+            <a:r>
+              <a:rPr lang="en" sz="1600" b="1" dirty="0" smtClean="0"/>
+              <a:t>Notepad++ </a:t>
+            </a:r>
+            <a:r>
+              <a:rPr lang="en" sz="1600" dirty="0" smtClean="0"/>
+              <a:t>(Windows search for it) and see what it contains.</a:t>
+            </a:r>
+            <a:endParaRPr lang="en" sz="1600" dirty="0" smtClean="0"/>
           </a:p>
           <a:p>
             <a:pPr marL="342900" lvl="1" indent="-342900"/>
@@ -9898,14 +9985,14 @@
               <a:buChar char="o"/>
             </a:pPr>
             <a:r>
-              <a:rPr lang="en" sz="1800" dirty="0" smtClean="0">
+              <a:rPr lang="en" sz="1600" dirty="0" smtClean="0">
                 <a:latin typeface="Courier New" panose="02070309020205020404" pitchFamily="49" charset="0"/>
                 <a:cs typeface="Courier New" panose="02070309020205020404" pitchFamily="49" charset="0"/>
               </a:rPr>
               <a:t>getRandomMonthID() </a:t>
             </a:r>
             <a:r>
-              <a:rPr lang="en" sz="1800" dirty="0" smtClean="0"/>
+              <a:rPr lang="en" sz="1600" dirty="0" smtClean="0"/>
               <a:t>will fetch a number from between 0 and 11</a:t>
             </a:r>
           </a:p>
@@ -9915,14 +10002,14 @@
               <a:buChar char="o"/>
             </a:pPr>
             <a:r>
-              <a:rPr lang="en" sz="1800" dirty="0" smtClean="0">
+              <a:rPr lang="en" sz="1600" dirty="0" smtClean="0">
                 <a:latin typeface="Courier New" panose="02070309020205020404" pitchFamily="49" charset="0"/>
                 <a:cs typeface="Courier New" panose="02070309020205020404" pitchFamily="49" charset="0"/>
               </a:rPr>
               <a:t>getMonth() </a:t>
             </a:r>
             <a:r>
-              <a:rPr lang="en" sz="1800" dirty="0" smtClean="0"/>
+              <a:rPr lang="en" sz="1600" dirty="0" smtClean="0"/>
               <a:t>takes a number from between 0 and 11 and gives </a:t>
             </a:r>
           </a:p>
@@ -9931,7 +10018,7 @@
               <a:buNone/>
             </a:pPr>
             <a:r>
-              <a:rPr lang="en" sz="1800" dirty="0" smtClean="0"/>
+              <a:rPr lang="en" sz="1600" dirty="0" smtClean="0"/>
               <a:t>back a text month</a:t>
             </a:r>
           </a:p>
@@ -9941,14 +10028,14 @@
               <a:buChar char="o"/>
             </a:pPr>
             <a:r>
-              <a:rPr lang="en" sz="1800" dirty="0" smtClean="0">
+              <a:rPr lang="en" sz="1600" dirty="0" smtClean="0">
                 <a:latin typeface="Courier New" panose="02070309020205020404" pitchFamily="49" charset="0"/>
                 <a:cs typeface="Courier New" panose="02070309020205020404" pitchFamily="49" charset="0"/>
               </a:rPr>
               <a:t>“$”</a:t>
             </a:r>
             <a:r>
-              <a:rPr lang="en" sz="1800" dirty="0" smtClean="0"/>
+              <a:rPr lang="en" sz="1600" dirty="0" smtClean="0"/>
               <a:t> is used to tell PsychoPy that we are about to run a small snippet of Python code</a:t>
             </a:r>
           </a:p>
@@ -10897,23 +10984,23 @@
               <a:buNone/>
             </a:pPr>
             <a:r>
-              <a:rPr lang="en-GB" dirty="0" smtClean="0">
+              <a:rPr lang="en-GB" sz="2800" dirty="0" smtClean="0">
                 <a:solidFill>
                   <a:srgbClr val="FF0000"/>
                 </a:solidFill>
               </a:rPr>
-              <a:t>IMPORTANT! </a:t>
-            </a:r>
-            <a:r>
-              <a:rPr lang="en-GB" dirty="0" smtClean="0"/>
+              <a:t>REMEMBER! </a:t>
+            </a:r>
+            <a:r>
+              <a:rPr lang="en-GB" sz="2800" dirty="0" smtClean="0"/>
               <a:t>Then </a:t>
             </a:r>
             <a:r>
-              <a:rPr lang="en-GB" dirty="0"/>
+              <a:rPr lang="en-GB" sz="2800" dirty="0"/>
               <a:t>unzip by right clicking and selecting “Extract all</a:t>
             </a:r>
             <a:r>
-              <a:rPr lang="en-GB" dirty="0" smtClean="0"/>
+              <a:rPr lang="en-GB" sz="2800" dirty="0" smtClean="0"/>
               <a:t>”.</a:t>
             </a:r>
           </a:p>
@@ -11020,7 +11107,23 @@
           <a:p>
             <a:r>
               <a:rPr lang="en-GB" dirty="0" smtClean="0"/>
-              <a:t>Test experiment in actual lab 24 hours before</a:t>
+              <a:t>Test experiment in actual lab </a:t>
+            </a:r>
+            <a:r>
+              <a:rPr lang="en-GB" b="1" dirty="0" smtClean="0">
+                <a:solidFill>
+                  <a:srgbClr val="FF0000"/>
+                </a:solidFill>
+              </a:rPr>
+              <a:t>at least </a:t>
+            </a:r>
+            <a:r>
+              <a:rPr lang="en-GB" dirty="0" smtClean="0"/>
+              <a:t>24 </a:t>
+            </a:r>
+            <a:r>
+              <a:rPr lang="en-GB" dirty="0" smtClean="0"/>
+              <a:t>hours before</a:t>
             </a:r>
           </a:p>
           <a:p>
@@ -11056,12 +11159,35 @@
             </a:pPr>
             <a:r>
               <a:rPr lang="en-GB" dirty="0" smtClean="0"/>
-              <a:t>i.e. Don’t use a variable name with the same name as a routine!</a:t>
-            </a:r>
-          </a:p>
-          <a:p>
+              <a:t>i.e. Don’t use a variable name with the same name as a routine</a:t>
+            </a:r>
             <a:r>
               <a:rPr lang="en-GB" dirty="0" smtClean="0"/>
+              <a:t>!</a:t>
+            </a:r>
+          </a:p>
+          <a:p>
+            <a:pPr lvl="1">
+              <a:buFont typeface="Courier New" panose="02070309020205020404" pitchFamily="49" charset="0"/>
+              <a:buChar char="o"/>
+            </a:pPr>
+            <a:r>
+              <a:rPr lang="en-GB" dirty="0"/>
+              <a:t>e</a:t>
+            </a:r>
+            <a:r>
+              <a:rPr lang="en-GB" dirty="0" smtClean="0"/>
+              <a:t>.g. “image”</a:t>
+            </a:r>
+            <a:endParaRPr lang="en-GB" dirty="0" smtClean="0"/>
+          </a:p>
+          <a:p>
+            <a:r>
+              <a:rPr lang="en-GB" dirty="0" smtClean="0">
+                <a:solidFill>
+                  <a:srgbClr val="FF0000"/>
+                </a:solidFill>
+              </a:rPr>
               <a:t>Make regular backups!!</a:t>
             </a:r>
           </a:p>
@@ -12048,6 +12174,16 @@
             <a:pPr marL="0" indent="0">
               <a:buNone/>
             </a:pPr>
+            <a:endParaRPr lang="en-US" dirty="0"/>
+          </a:p>
+          <a:p>
+            <a:pPr marL="0" indent="0">
+              <a:buNone/>
+            </a:pPr>
+            <a:r>
+              <a:rPr lang="en-US" dirty="0" smtClean="0"/>
+              <a:t>Book + Additional slides of interest.</a:t>
+            </a:r>
             <a:endParaRPr lang="en-US" dirty="0"/>
           </a:p>
         </p:txBody>
@@ -13122,7 +13258,11 @@
             </a:pPr>
             <a:r>
               <a:rPr lang="en-GB" b="1" dirty="0" smtClean="0"/>
-              <a:t>Start up parameters</a:t>
+              <a:t>1. Start </a:t>
+            </a:r>
+            <a:r>
+              <a:rPr lang="en-GB" b="1" dirty="0" smtClean="0"/>
+              <a:t>up parameters</a:t>
             </a:r>
           </a:p>
           <a:p>
@@ -13152,74 +13292,17 @@
           <a:p>
             <a:r>
               <a:rPr lang="en-GB" dirty="0" smtClean="0"/>
-              <a:t>To add your own, click the experiment settings icon</a:t>
-            </a:r>
-          </a:p>
-          <a:p>
-            <a:pPr lvl="1">
-              <a:buFont typeface="Courier New" panose="02070309020205020404" pitchFamily="49" charset="0"/>
-              <a:buChar char="o"/>
-            </a:pPr>
-            <a:endParaRPr lang="en" sz="1800" b="1" u="sng" dirty="0" smtClean="0">
-              <a:solidFill>
-                <a:schemeClr val="accent2"/>
-              </a:solidFill>
-              <a:latin typeface="Courier New"/>
-              <a:ea typeface="Courier New"/>
-              <a:cs typeface="Courier New"/>
-              <a:sym typeface="Courier New"/>
-            </a:endParaRPr>
-          </a:p>
-          <a:p>
-            <a:pPr marL="457200" lvl="1" indent="0">
-              <a:buNone/>
-            </a:pPr>
-            <a:r>
-              <a:rPr lang="en" sz="1800" b="1" u="sng" dirty="0" smtClean="0">
-                <a:solidFill>
-                  <a:schemeClr val="accent2"/>
-                </a:solidFill>
-                <a:latin typeface="Courier New"/>
-                <a:ea typeface="Courier New"/>
-                <a:cs typeface="Courier New"/>
-                <a:sym typeface="Courier New"/>
-              </a:rPr>
-              <a:t>http</a:t>
-            </a:r>
-            <a:r>
-              <a:rPr lang="en" sz="1800" b="1" u="sng" dirty="0">
-                <a:solidFill>
-                  <a:schemeClr val="accent2"/>
-                </a:solidFill>
-                <a:latin typeface="Courier New"/>
-                <a:ea typeface="Courier New"/>
-                <a:cs typeface="Courier New"/>
-                <a:sym typeface="Courier New"/>
-              </a:rPr>
-              <a:t>://</a:t>
-            </a:r>
-            <a:r>
-              <a:rPr lang="en" sz="1800" b="1" u="sng" dirty="0" smtClean="0">
-                <a:solidFill>
-                  <a:schemeClr val="accent2"/>
-                </a:solidFill>
-                <a:latin typeface="Courier New"/>
-                <a:ea typeface="Courier New"/>
-                <a:cs typeface="Courier New"/>
-                <a:sym typeface="Courier New"/>
-              </a:rPr>
-              <a:t>www.psychopy.org/builder/settings.html</a:t>
-            </a:r>
-            <a:r>
-              <a:rPr lang="en-GB" sz="1800" b="1" dirty="0" smtClean="0">
-                <a:solidFill>
-                  <a:schemeClr val="accent2"/>
-                </a:solidFill>
-              </a:rPr>
-              <a:t>  </a:t>
-            </a:r>
-          </a:p>
-          <a:p>
+              <a:t>To add your own, click the experiment settings </a:t>
+            </a:r>
+            <a:r>
+              <a:rPr lang="en-GB" dirty="0" smtClean="0"/>
+              <a:t>icon</a:t>
+            </a:r>
+          </a:p>
+          <a:p>
+            <a:pPr marL="0" indent="0">
+              <a:buNone/>
+            </a:pPr>
             <a:endParaRPr lang="en-GB" dirty="0"/>
           </a:p>
           <a:p>
@@ -13228,7 +13311,11 @@
             </a:pPr>
             <a:r>
               <a:rPr lang="en-GB" b="1" dirty="0" smtClean="0"/>
-              <a:t>Add to Excel data file</a:t>
+              <a:t>2. Add </a:t>
+            </a:r>
+            <a:r>
+              <a:rPr lang="en-GB" b="1" dirty="0" smtClean="0"/>
+              <a:t>to Excel data file</a:t>
             </a:r>
             <a:endParaRPr lang="en-GB" b="1" dirty="0"/>
           </a:p>
@@ -13241,8 +13328,23 @@
           <a:p>
             <a:r>
               <a:rPr lang="en-GB" dirty="0" smtClean="0"/>
-              <a:t>Add a new column in your data file – that is it!</a:t>
-            </a:r>
+              <a:t>You can add </a:t>
+            </a:r>
+            <a:r>
+              <a:rPr lang="en-GB" dirty="0" smtClean="0"/>
+              <a:t>a new column in your data file – that is it</a:t>
+            </a:r>
+            <a:r>
+              <a:rPr lang="en-GB" dirty="0" smtClean="0"/>
+              <a:t>!</a:t>
+            </a:r>
+          </a:p>
+          <a:p>
+            <a:r>
+              <a:rPr lang="en-GB" dirty="0" smtClean="0"/>
+              <a:t>It will appear in your output files automatically.</a:t>
+            </a:r>
+            <a:endParaRPr lang="en-GB" dirty="0" smtClean="0"/>
           </a:p>
           <a:p>
             <a:endParaRPr lang="en-GB" dirty="0"/>
@@ -13253,7 +13355,11 @@
             </a:pPr>
             <a:r>
               <a:rPr lang="en-GB" b="1" dirty="0" smtClean="0"/>
-              <a:t>Through embedded Python code</a:t>
+              <a:t>3. Through </a:t>
+            </a:r>
+            <a:r>
+              <a:rPr lang="en-GB" b="1" dirty="0" smtClean="0"/>
+              <a:t>embedded Python code</a:t>
             </a:r>
             <a:endParaRPr lang="en-GB" b="1" dirty="0"/>
           </a:p>
@@ -13297,7 +13403,7 @@
         </p:blipFill>
         <p:spPr>
           <a:xfrm>
-            <a:off x="6274487" y="2913608"/>
+            <a:off x="6322112" y="3123158"/>
             <a:ext cx="489731" cy="377851"/>
           </a:xfrm>
           <a:prstGeom prst="rect">
@@ -14462,7 +14568,6 @@
               <a:rPr lang="en-GB" dirty="0" smtClean="0"/>
               <a:t>It is possible to do a loop within a loop</a:t>
             </a:r>
-            <a:endParaRPr lang="en-GB" dirty="0" smtClean="0"/>
           </a:p>
           <a:p>
             <a:r>
@@ -14544,13 +14649,8 @@
             </a:pPr>
             <a:r>
               <a:rPr lang="en-GB" dirty="0" smtClean="0"/>
-              <a:t>Lets </a:t>
-            </a:r>
-            <a:r>
-              <a:rPr lang="en-GB" dirty="0" smtClean="0"/>
-              <a:t>look at the example in action… </a:t>
-            </a:r>
-            <a:endParaRPr lang="en-GB" dirty="0" smtClean="0"/>
+              <a:t>Lets look at the example in action… </a:t>
+            </a:r>
           </a:p>
           <a:p>
             <a:pPr marL="0" indent="0">
@@ -14562,15 +14662,7 @@
                   <a:srgbClr val="FF0000"/>
                 </a:solidFill>
               </a:rPr>
-              <a:t>(</a:t>
-            </a:r>
-            <a:r>
-              <a:rPr lang="en-GB" dirty="0" smtClean="0">
-                <a:solidFill>
-                  <a:srgbClr val="FF0000"/>
-                </a:solidFill>
-              </a:rPr>
-              <a:t>DEMO)</a:t>
+              <a:t>(DEMO)</a:t>
             </a:r>
           </a:p>
         </p:txBody>
@@ -15110,7 +15202,7 @@
         <p:spPr/>
         <p:txBody>
           <a:bodyPr>
-            <a:normAutofit fontScale="92500" lnSpcReduction="10000"/>
+            <a:normAutofit fontScale="92500" lnSpcReduction="20000"/>
           </a:bodyPr>
           <a:lstStyle/>
           <a:p>
@@ -15119,7 +15211,34 @@
             </a:pPr>
             <a:r>
               <a:rPr lang="en-GB" dirty="0" smtClean="0"/>
-              <a:t>Open up </a:t>
+              <a:t>Close any other </a:t>
+            </a:r>
+            <a:r>
+              <a:rPr lang="en-GB" dirty="0" err="1" smtClean="0"/>
+              <a:t>PsychoPy</a:t>
+            </a:r>
+            <a:r>
+              <a:rPr lang="en-GB" dirty="0" smtClean="0"/>
+              <a:t> windows you have open.</a:t>
+            </a:r>
+          </a:p>
+          <a:p>
+            <a:pPr marL="0" indent="0">
+              <a:buNone/>
+            </a:pPr>
+            <a:endParaRPr lang="en-GB" dirty="0" smtClean="0"/>
+          </a:p>
+          <a:p>
+            <a:pPr marL="0" indent="0">
+              <a:buNone/>
+            </a:pPr>
+            <a:r>
+              <a:rPr lang="en-GB" dirty="0" smtClean="0"/>
+              <a:t>Then open </a:t>
+            </a:r>
+            <a:r>
+              <a:rPr lang="en-GB" dirty="0" smtClean="0"/>
+              <a:t>up </a:t>
             </a:r>
             <a:r>
               <a:rPr lang="en-GB" dirty="0" smtClean="0">

</xml_diff>